<commit_message>
gramar fixes in presentation
</commit_message>
<xml_diff>
--- a/GREENDAO.pptx
+++ b/GREENDAO.pptx
@@ -3866,7 +3866,7 @@
         </p:nvSpPr>
         <p:spPr>
           <a:xfrm>
-            <a:off x="737419" y="1693889"/>
+            <a:off x="1677945" y="2190277"/>
             <a:ext cx="8150942" cy="1754326"/>
           </a:xfrm>
           <a:prstGeom prst="rect">
@@ -4073,7 +4073,7 @@
         </p:nvSpPr>
         <p:spPr>
           <a:xfrm>
-            <a:off x="737419" y="1693889"/>
+            <a:off x="1617406" y="2007398"/>
             <a:ext cx="9212826" cy="3139321"/>
           </a:xfrm>
           <a:prstGeom prst="rect">
@@ -4793,8 +4793,21 @@
                 <a:ea typeface="Open Sans Light" panose="020B0306030504020204" pitchFamily="34" charset="0"/>
                 <a:cs typeface="Open Sans Light" panose="020B0306030504020204" pitchFamily="34" charset="0"/>
               </a:rPr>
-              <a:t>DOŚĆ GADANIA PORA KODZENIA</a:t>
-            </a:r>
+              <a:t>DOŚĆ GADANIA PORA </a:t>
+            </a:r>
+            <a:r>
+              <a:rPr lang="pl-PL" dirty="0" smtClean="0">
+                <a:latin typeface="Open Sans Light" panose="020B0306030504020204" pitchFamily="34" charset="0"/>
+                <a:ea typeface="Open Sans Light" panose="020B0306030504020204" pitchFamily="34" charset="0"/>
+                <a:cs typeface="Open Sans Light" panose="020B0306030504020204" pitchFamily="34" charset="0"/>
+              </a:rPr>
+              <a:t>NA KODZENIE</a:t>
+            </a:r>
+            <a:endParaRPr lang="pl-PL" dirty="0">
+              <a:latin typeface="Open Sans Light" panose="020B0306030504020204" pitchFamily="34" charset="0"/>
+              <a:ea typeface="Open Sans Light" panose="020B0306030504020204" pitchFamily="34" charset="0"/>
+              <a:cs typeface="Open Sans Light" panose="020B0306030504020204" pitchFamily="34" charset="0"/>
+            </a:endParaRPr>
           </a:p>
         </p:txBody>
       </p:sp>
@@ -4878,6 +4891,12 @@
               </a:rPr>
               <a:t>Od idei do bazy danych</a:t>
             </a:r>
+            <a:r>
+              <a:rPr lang="pl-PL" dirty="0">
+                <a:latin typeface="High Tower Text" panose="02040502050506030303" pitchFamily="18" charset="0"/>
+              </a:rPr>
+              <a:t/>
+            </a:r>
             <a:br>
               <a:rPr lang="pl-PL" dirty="0">
                 <a:latin typeface="High Tower Text" panose="02040502050506030303" pitchFamily="18" charset="0"/>
@@ -5278,6 +5297,12 @@
               </a:rPr>
               <a:t>Od idei do bazy danych</a:t>
             </a:r>
+            <a:r>
+              <a:rPr lang="pl-PL" dirty="0">
+                <a:latin typeface="High Tower Text" panose="02040502050506030303" pitchFamily="18" charset="0"/>
+              </a:rPr>
+              <a:t/>
+            </a:r>
             <a:br>
               <a:rPr lang="pl-PL" dirty="0">
                 <a:latin typeface="High Tower Text" panose="02040502050506030303" pitchFamily="18" charset="0"/>
@@ -5549,6 +5574,12 @@
               </a:rPr>
               <a:t>Od idei do bazy danych</a:t>
             </a:r>
+            <a:r>
+              <a:rPr lang="pl-PL" dirty="0">
+                <a:latin typeface="High Tower Text" panose="02040502050506030303" pitchFamily="18" charset="0"/>
+              </a:rPr>
+              <a:t/>
+            </a:r>
             <a:br>
               <a:rPr lang="pl-PL" dirty="0">
                 <a:latin typeface="High Tower Text" panose="02040502050506030303" pitchFamily="18" charset="0"/>
@@ -5820,6 +5851,12 @@
               </a:rPr>
               <a:t>Od idei do bazy danych</a:t>
             </a:r>
+            <a:r>
+              <a:rPr lang="pl-PL" dirty="0">
+                <a:latin typeface="High Tower Text" panose="02040502050506030303" pitchFamily="18" charset="0"/>
+              </a:rPr>
+              <a:t/>
+            </a:r>
             <a:br>
               <a:rPr lang="pl-PL" dirty="0">
                 <a:latin typeface="High Tower Text" panose="02040502050506030303" pitchFamily="18" charset="0"/>
@@ -6379,11 +6416,23 @@
               </a:rPr>
               <a:t>CRUD – od czegoś trzeba zacząć </a:t>
             </a:r>
+            <a:r>
+              <a:rPr lang="pl-PL" dirty="0">
+                <a:latin typeface="High Tower Text" panose="02040502050506030303" pitchFamily="18" charset="0"/>
+              </a:rPr>
+              <a:t/>
+            </a:r>
             <a:br>
               <a:rPr lang="pl-PL" dirty="0">
                 <a:latin typeface="High Tower Text" panose="02040502050506030303" pitchFamily="18" charset="0"/>
               </a:rPr>
             </a:br>
+            <a:r>
+              <a:rPr lang="pl-PL" dirty="0">
+                <a:latin typeface="High Tower Text" panose="02040502050506030303" pitchFamily="18" charset="0"/>
+              </a:rPr>
+              <a:t/>
+            </a:r>
             <a:br>
               <a:rPr lang="pl-PL" dirty="0">
                 <a:latin typeface="High Tower Text" panose="02040502050506030303" pitchFamily="18" charset="0"/>
@@ -6561,6 +6610,12 @@
               </a:rPr>
               <a:t>Podsumowanie</a:t>
             </a:r>
+            <a:r>
+              <a:rPr lang="pl-PL" dirty="0">
+                <a:latin typeface="High Tower Text" panose="02040502050506030303" pitchFamily="18" charset="0"/>
+              </a:rPr>
+              <a:t/>
+            </a:r>
             <a:br>
               <a:rPr lang="pl-PL" dirty="0">
                 <a:latin typeface="High Tower Text" panose="02040502050506030303" pitchFamily="18" charset="0"/>
@@ -6875,6 +6930,12 @@
               </a:rPr>
               <a:t>Dziękuję za uwagę</a:t>
             </a:r>
+            <a:r>
+              <a:rPr lang="pl-PL" dirty="0">
+                <a:latin typeface="High Tower Text" panose="02040502050506030303" pitchFamily="18" charset="0"/>
+              </a:rPr>
+              <a:t/>
+            </a:r>
             <a:br>
               <a:rPr lang="pl-PL" dirty="0">
                 <a:latin typeface="High Tower Text" panose="02040502050506030303" pitchFamily="18" charset="0"/>
@@ -7106,7 +7167,7 @@
               <a:t> i </a:t>
             </a:r>
             <a:r>
-              <a:rPr lang="pl-PL" dirty="0" err="1">
+              <a:rPr lang="pl-PL" dirty="0" err="1" smtClean="0">
                 <a:latin typeface="Open Sans Light" panose="020B0306030504020204" pitchFamily="34" charset="0"/>
                 <a:ea typeface="Open Sans Light" panose="020B0306030504020204" pitchFamily="34" charset="0"/>
                 <a:cs typeface="Open Sans Light" panose="020B0306030504020204" pitchFamily="34" charset="0"/>
@@ -7119,8 +7180,13 @@
                 <a:ea typeface="Open Sans Light" panose="020B0306030504020204" pitchFamily="34" charset="0"/>
                 <a:cs typeface="Open Sans Light" panose="020B0306030504020204" pitchFamily="34" charset="0"/>
               </a:rPr>
-              <a:t> - </a:t>
-            </a:r>
+              <a:t>	</a:t>
+            </a:r>
+            <a:endParaRPr lang="pl-PL" dirty="0">
+              <a:latin typeface="Open Sans Light" panose="020B0306030504020204" pitchFamily="34" charset="0"/>
+              <a:ea typeface="Open Sans Light" panose="020B0306030504020204" pitchFamily="34" charset="0"/>
+              <a:cs typeface="Open Sans Light" panose="020B0306030504020204" pitchFamily="34" charset="0"/>
+            </a:endParaRPr>
           </a:p>
           <a:p>
             <a:pPr marL="514350" indent="-514350">
@@ -8066,8 +8132,21 @@
                 <a:ea typeface="Open Sans Light" panose="020B0306030504020204" pitchFamily="34" charset="0"/>
                 <a:cs typeface="Open Sans Light" panose="020B0306030504020204" pitchFamily="34" charset="0"/>
               </a:rPr>
-              <a:t>Generowanie potrzebnego kodu w trakcie budowania aplikacji.</a:t>
-            </a:r>
+              <a:t>Generowanie potrzebnego kodu w trakcie budowania </a:t>
+            </a:r>
+            <a:r>
+              <a:rPr lang="pl-PL" dirty="0" smtClean="0">
+                <a:latin typeface="Open Sans Light" panose="020B0306030504020204" pitchFamily="34" charset="0"/>
+                <a:ea typeface="Open Sans Light" panose="020B0306030504020204" pitchFamily="34" charset="0"/>
+                <a:cs typeface="Open Sans Light" panose="020B0306030504020204" pitchFamily="34" charset="0"/>
+              </a:rPr>
+              <a:t>aplikacji</a:t>
+            </a:r>
+            <a:endParaRPr lang="pl-PL" dirty="0">
+              <a:latin typeface="Open Sans Light" panose="020B0306030504020204" pitchFamily="34" charset="0"/>
+              <a:ea typeface="Open Sans Light" panose="020B0306030504020204" pitchFamily="34" charset="0"/>
+              <a:cs typeface="Open Sans Light" panose="020B0306030504020204" pitchFamily="34" charset="0"/>
+            </a:endParaRPr>
           </a:p>
           <a:p>
             <a:pPr marL="285750" indent="-285750">
@@ -8381,7 +8460,23 @@
                 <a:ea typeface="Open Sans Light" panose="020B0306030504020204" pitchFamily="34" charset="0"/>
                 <a:cs typeface="Open Sans Light" panose="020B0306030504020204" pitchFamily="34" charset="0"/>
               </a:rPr>
-              <a:t>Brak możliwości generowania zapytań złożonych zapytań, grupowania, </a:t>
+              <a:t>Brak możliwości generowania </a:t>
+            </a:r>
+            <a:r>
+              <a:rPr lang="pl-PL" dirty="0" smtClean="0">
+                <a:latin typeface="Open Sans Light" panose="020B0306030504020204" pitchFamily="34" charset="0"/>
+                <a:ea typeface="Open Sans Light" panose="020B0306030504020204" pitchFamily="34" charset="0"/>
+                <a:cs typeface="Open Sans Light" panose="020B0306030504020204" pitchFamily="34" charset="0"/>
+              </a:rPr>
+              <a:t>złożonych </a:t>
+            </a:r>
+            <a:r>
+              <a:rPr lang="pl-PL" dirty="0">
+                <a:latin typeface="Open Sans Light" panose="020B0306030504020204" pitchFamily="34" charset="0"/>
+                <a:ea typeface="Open Sans Light" panose="020B0306030504020204" pitchFamily="34" charset="0"/>
+                <a:cs typeface="Open Sans Light" panose="020B0306030504020204" pitchFamily="34" charset="0"/>
+              </a:rPr>
+              <a:t>zapytań, grupowania, </a:t>
             </a:r>
             <a:r>
               <a:rPr lang="pl-PL" dirty="0" err="1">
@@ -8411,7 +8506,15 @@
                 <a:ea typeface="Open Sans Light" panose="020B0306030504020204" pitchFamily="34" charset="0"/>
                 <a:cs typeface="Open Sans Light" panose="020B0306030504020204" pitchFamily="34" charset="0"/>
               </a:rPr>
-              <a:t>Optymalne rozwiązywanie relacji tylko dla kluczy które są typu </a:t>
+              <a:t>Optymalne rozwiązywanie relacji tylko dla kluczy </a:t>
+            </a:r>
+            <a:r>
+              <a:rPr lang="pl-PL" dirty="0" smtClean="0">
+                <a:latin typeface="Open Sans Light" panose="020B0306030504020204" pitchFamily="34" charset="0"/>
+                <a:ea typeface="Open Sans Light" panose="020B0306030504020204" pitchFamily="34" charset="0"/>
+                <a:cs typeface="Open Sans Light" panose="020B0306030504020204" pitchFamily="34" charset="0"/>
+              </a:rPr>
+              <a:t>typu </a:t>
             </a:r>
             <a:r>
               <a:rPr lang="pl-PL" dirty="0" err="1">
@@ -8438,8 +8541,21 @@
                 <a:ea typeface="Open Sans Light" panose="020B0306030504020204" pitchFamily="34" charset="0"/>
                 <a:cs typeface="Open Sans Light" panose="020B0306030504020204" pitchFamily="34" charset="0"/>
               </a:rPr>
-              <a:t>Wydłużenie czasu budowania aplikacji, konieczność każdorazowego czyszczenia</a:t>
-            </a:r>
+              <a:t>Wydłużenie czasu budowania aplikacji, konieczność każdorazowego </a:t>
+            </a:r>
+            <a:r>
+              <a:rPr lang="pl-PL" dirty="0" smtClean="0">
+                <a:latin typeface="Open Sans Light" panose="020B0306030504020204" pitchFamily="34" charset="0"/>
+                <a:ea typeface="Open Sans Light" panose="020B0306030504020204" pitchFamily="34" charset="0"/>
+                <a:cs typeface="Open Sans Light" panose="020B0306030504020204" pitchFamily="34" charset="0"/>
+              </a:rPr>
+              <a:t>czyszczenia projektu, po modyfikacji modelu</a:t>
+            </a:r>
+            <a:endParaRPr lang="pl-PL" dirty="0">
+              <a:latin typeface="Open Sans Light" panose="020B0306030504020204" pitchFamily="34" charset="0"/>
+              <a:ea typeface="Open Sans Light" panose="020B0306030504020204" pitchFamily="34" charset="0"/>
+              <a:cs typeface="Open Sans Light" panose="020B0306030504020204" pitchFamily="34" charset="0"/>
+            </a:endParaRPr>
           </a:p>
           <a:p>
             <a:pPr marL="285750" indent="-285750">

</xml_diff>